<commit_message>
updated slides as pdf
</commit_message>
<xml_diff>
--- a/grails-die-suche-ist-vorbei/grails-doagkonferenz-2011.pptx
+++ b/grails-die-suche-ist-vorbei/grails-doagkonferenz-2011.pptx
@@ -1446,8 +1446,8 @@
     <dgm:cxn modelId="{E7A28185-E3B0-45A7-85E0-A10425BC2D41}" type="presOf" srcId="{3EA38FB7-077E-4699-860B-B7481A9FF50F}" destId="{C83AB4E9-A066-4C32-9B94-64C1161EA86D}" srcOrd="0" destOrd="0" presId="urn:microsoft.com/office/officeart/2005/8/layout/matrix1"/>
     <dgm:cxn modelId="{797A5495-0C2E-4990-B05E-B75AD751CE1E}" type="presOf" srcId="{50C3BD8F-FA35-49F1-A571-92963C2C793A}" destId="{D057D4C4-7C7C-437F-9AA7-E77B3A3EC01F}" srcOrd="1" destOrd="0" presId="urn:microsoft.com/office/officeart/2005/8/layout/matrix1"/>
     <dgm:cxn modelId="{F4103C12-A425-44D8-866D-553E2C235872}" type="presOf" srcId="{F7671500-8297-4F3E-BDCE-879BE72411ED}" destId="{94717272-4243-488C-95AF-FD69DB98ADDE}" srcOrd="1" destOrd="0" presId="urn:microsoft.com/office/officeart/2005/8/layout/matrix1"/>
+    <dgm:cxn modelId="{BB320B12-6487-4989-9CA8-ECD92005A8C1}" type="presOf" srcId="{3EA38FB7-077E-4699-860B-B7481A9FF50F}" destId="{707396D3-4F4C-4E1B-AE8E-A842EB5E2755}" srcOrd="1" destOrd="0" presId="urn:microsoft.com/office/officeart/2005/8/layout/matrix1"/>
     <dgm:cxn modelId="{BD74DB50-200D-4700-A3BD-7C0511274F22}" srcId="{322F7167-D7E5-435C-A8CC-52B42FC6266D}" destId="{3EA38FB7-077E-4699-860B-B7481A9FF50F}" srcOrd="1" destOrd="0" parTransId="{4DD7F543-659B-4F40-8415-BF27977ED8CD}" sibTransId="{68EF7038-8C23-4620-9AB0-30A383CCC59B}"/>
-    <dgm:cxn modelId="{BB320B12-6487-4989-9CA8-ECD92005A8C1}" type="presOf" srcId="{3EA38FB7-077E-4699-860B-B7481A9FF50F}" destId="{707396D3-4F4C-4E1B-AE8E-A842EB5E2755}" srcOrd="1" destOrd="0" presId="urn:microsoft.com/office/officeart/2005/8/layout/matrix1"/>
     <dgm:cxn modelId="{1E87FFFD-6E68-4A9F-82A9-205D3F5EF0EF}" type="presOf" srcId="{50C3BD8F-FA35-49F1-A571-92963C2C793A}" destId="{2C465FEE-CF80-4909-804E-3204153E6FF1}" srcOrd="0" destOrd="0" presId="urn:microsoft.com/office/officeart/2005/8/layout/matrix1"/>
     <dgm:cxn modelId="{A4303F15-0D9A-4086-AE14-98BBB28075D6}" srcId="{322F7167-D7E5-435C-A8CC-52B42FC6266D}" destId="{50C3BD8F-FA35-49F1-A571-92963C2C793A}" srcOrd="0" destOrd="0" parTransId="{9BB94167-7A35-4231-AA02-49CB216E6D62}" sibTransId="{C472C849-4A5C-43BB-903D-5ED6B655CEEC}"/>
     <dgm:cxn modelId="{FA87375C-D0A7-4452-B481-67F727AAA2AA}" type="presOf" srcId="{F7671500-8297-4F3E-BDCE-879BE72411ED}" destId="{2BCBC29C-5067-4C24-BDB5-16718A53AE6A}" srcOrd="0" destOrd="0" presId="urn:microsoft.com/office/officeart/2005/8/layout/matrix1"/>
@@ -3442,7 +3442,7 @@
     </p:spTree>
     <p:extLst>
       <p:ext uri="{BB962C8B-B14F-4D97-AF65-F5344CB8AC3E}">
-        <p14:creationId xmlns:p14="http://schemas.microsoft.com/office/powerpoint/2010/main" xmlns="" val="4179175705"/>
+        <p14:creationId xmlns="" xmlns:p14="http://schemas.microsoft.com/office/powerpoint/2010/main" val="4179175705"/>
       </p:ext>
     </p:extLst>
   </p:cSld>
@@ -3706,7 +3706,7 @@
     </p:spTree>
     <p:extLst>
       <p:ext uri="{BB962C8B-B14F-4D97-AF65-F5344CB8AC3E}">
-        <p14:creationId xmlns:p14="http://schemas.microsoft.com/office/powerpoint/2010/main" xmlns="" val="1834322205"/>
+        <p14:creationId xmlns="" xmlns:p14="http://schemas.microsoft.com/office/powerpoint/2010/main" val="1834322205"/>
       </p:ext>
     </p:extLst>
   </p:cSld>
@@ -3881,7 +3881,7 @@
     </p:spTree>
     <p:extLst>
       <p:ext uri="{BB962C8B-B14F-4D97-AF65-F5344CB8AC3E}">
-        <p14:creationId xmlns:p14="http://schemas.microsoft.com/office/powerpoint/2010/main" xmlns="" val="824769565"/>
+        <p14:creationId xmlns="" xmlns:p14="http://schemas.microsoft.com/office/powerpoint/2010/main" val="824769565"/>
       </p:ext>
     </p:extLst>
   </p:cSld>
@@ -14101,7 +14101,7 @@
     </p:spTree>
     <p:extLst>
       <p:ext uri="{BB962C8B-B14F-4D97-AF65-F5344CB8AC3E}">
-        <p14:creationId xmlns:p14="http://schemas.microsoft.com/office/powerpoint/2010/main" xmlns="" val="3634760287"/>
+        <p14:creationId xmlns="" xmlns:p14="http://schemas.microsoft.com/office/powerpoint/2010/main" val="3634760287"/>
       </p:ext>
     </p:extLst>
   </p:cSld>
@@ -20727,35 +20727,88 @@
                 <a:latin typeface="Consolas" pitchFamily="49" charset="0"/>
                 <a:cs typeface="Consolas" pitchFamily="49" charset="0"/>
               </a:rPr>
-              <a:t>: </a:t>
+              <a:t>: '</a:t>
+            </a:r>
+            <a:r>
+              <a:rPr lang="de-DE" sz="1600" dirty="0" err="1" smtClean="0">
+                <a:latin typeface="Consolas" pitchFamily="49" charset="0"/>
+                <a:cs typeface="Consolas" pitchFamily="49" charset="0"/>
+              </a:rPr>
+              <a:t>Geröllheimer</a:t>
             </a:r>
             <a:r>
               <a:rPr lang="de-DE" sz="1600" dirty="0" smtClean="0">
                 <a:latin typeface="Consolas" pitchFamily="49" charset="0"/>
                 <a:cs typeface="Consolas" pitchFamily="49" charset="0"/>
               </a:rPr>
-              <a:t>'</a:t>
-            </a:r>
-            <a:r>
-              <a:rPr lang="de-DE" sz="1600" dirty="0" err="1" smtClean="0">
-                <a:latin typeface="Consolas" pitchFamily="49" charset="0"/>
-                <a:cs typeface="Consolas" pitchFamily="49" charset="0"/>
-              </a:rPr>
-              <a:t>Geröllheimer</a:t>
-            </a:r>
-            <a:r>
-              <a:rPr lang="de-DE" sz="1600" dirty="0" smtClean="0">
-                <a:latin typeface="Consolas" pitchFamily="49" charset="0"/>
-                <a:cs typeface="Consolas" pitchFamily="49" charset="0"/>
-              </a:rPr>
               <a:t>')]</a:t>
             </a:r>
+          </a:p>
+          <a:p>
             <a:endParaRPr lang="de-DE" sz="1600" dirty="0" smtClean="0">
               <a:latin typeface="Consolas" pitchFamily="49" charset="0"/>
               <a:cs typeface="Consolas" pitchFamily="49" charset="0"/>
             </a:endParaRPr>
           </a:p>
           <a:p>
+            <a:r>
+              <a:rPr lang="de-DE" sz="1600" dirty="0" err="1" smtClean="0">
+                <a:latin typeface="Consolas" pitchFamily="49" charset="0"/>
+                <a:cs typeface="Consolas" pitchFamily="49" charset="0"/>
+              </a:rPr>
+              <a:t>assert</a:t>
+            </a:r>
+            <a:r>
+              <a:rPr lang="de-DE" sz="1600" dirty="0" smtClean="0">
+                <a:latin typeface="Consolas" pitchFamily="49" charset="0"/>
+                <a:cs typeface="Consolas" pitchFamily="49" charset="0"/>
+              </a:rPr>
+              <a:t> ['Fred', 'Wilma'] == </a:t>
+            </a:r>
+          </a:p>
+          <a:p>
+            <a:r>
+              <a:rPr lang="de-DE" sz="1600" dirty="0" smtClean="0">
+                <a:latin typeface="Consolas" pitchFamily="49" charset="0"/>
+                <a:cs typeface="Consolas" pitchFamily="49" charset="0"/>
+              </a:rPr>
+              <a:t>       </a:t>
+            </a:r>
+            <a:r>
+              <a:rPr lang="de-DE" sz="1600" dirty="0" err="1" smtClean="0">
+                <a:latin typeface="Consolas" pitchFamily="49" charset="0"/>
+                <a:cs typeface="Consolas" pitchFamily="49" charset="0"/>
+              </a:rPr>
+              <a:t>people.findAll</a:t>
+            </a:r>
+            <a:r>
+              <a:rPr lang="de-DE" sz="1600" dirty="0" smtClean="0">
+                <a:latin typeface="Consolas" pitchFamily="49" charset="0"/>
+                <a:cs typeface="Consolas" pitchFamily="49" charset="0"/>
+              </a:rPr>
+              <a:t>{</a:t>
+            </a:r>
+            <a:r>
+              <a:rPr lang="de-DE" sz="1600" dirty="0" err="1" smtClean="0">
+                <a:latin typeface="Consolas" pitchFamily="49" charset="0"/>
+                <a:cs typeface="Consolas" pitchFamily="49" charset="0"/>
+              </a:rPr>
+              <a:t>it.lastName</a:t>
+            </a:r>
+            <a:r>
+              <a:rPr lang="de-DE" sz="1600" dirty="0" smtClean="0">
+                <a:latin typeface="Consolas" pitchFamily="49" charset="0"/>
+                <a:cs typeface="Consolas" pitchFamily="49" charset="0"/>
+              </a:rPr>
+              <a:t> == 'Feuerstein'}.</a:t>
+            </a:r>
+            <a:r>
+              <a:rPr lang="de-DE" sz="1600" dirty="0" err="1" smtClean="0">
+                <a:latin typeface="Consolas" pitchFamily="49" charset="0"/>
+                <a:cs typeface="Consolas" pitchFamily="49" charset="0"/>
+              </a:rPr>
+              <a:t>firstName</a:t>
+            </a:r>
             <a:endParaRPr lang="de-DE" sz="1600" dirty="0" smtClean="0">
               <a:latin typeface="Consolas" pitchFamily="49" charset="0"/>
               <a:cs typeface="Consolas" pitchFamily="49" charset="0"/>
@@ -20774,8 +20827,38 @@
                 <a:latin typeface="Consolas" pitchFamily="49" charset="0"/>
                 <a:cs typeface="Consolas" pitchFamily="49" charset="0"/>
               </a:rPr>
-              <a:t> ['Fred', 'Wilma'] == </a:t>
-            </a:r>
+              <a:t> ['Feuerstein':2, 'Geröllheimer':3] == </a:t>
+            </a:r>
+            <a:r>
+              <a:rPr lang="de-DE" sz="1600" dirty="0" err="1" smtClean="0">
+                <a:latin typeface="Consolas" pitchFamily="49" charset="0"/>
+                <a:cs typeface="Consolas" pitchFamily="49" charset="0"/>
+              </a:rPr>
+              <a:t>people.countBy</a:t>
+            </a:r>
+            <a:r>
+              <a:rPr lang="de-DE" sz="1600" dirty="0" smtClean="0">
+                <a:latin typeface="Consolas" pitchFamily="49" charset="0"/>
+                <a:cs typeface="Consolas" pitchFamily="49" charset="0"/>
+              </a:rPr>
+              <a:t>{</a:t>
+            </a:r>
+            <a:r>
+              <a:rPr lang="de-DE" sz="1600" dirty="0" err="1" smtClean="0">
+                <a:latin typeface="Consolas" pitchFamily="49" charset="0"/>
+                <a:cs typeface="Consolas" pitchFamily="49" charset="0"/>
+              </a:rPr>
+              <a:t>it.lastName</a:t>
+            </a:r>
+            <a:r>
+              <a:rPr lang="de-DE" sz="1600" dirty="0" smtClean="0">
+                <a:latin typeface="Consolas" pitchFamily="49" charset="0"/>
+                <a:cs typeface="Consolas" pitchFamily="49" charset="0"/>
+              </a:rPr>
+              <a:t>}</a:t>
+            </a:r>
+          </a:p>
+          <a:p>
             <a:endParaRPr lang="de-DE" sz="1600" dirty="0" smtClean="0">
               <a:latin typeface="Consolas" pitchFamily="49" charset="0"/>
               <a:cs typeface="Consolas" pitchFamily="49" charset="0"/>
@@ -20783,216 +20866,83 @@
           </a:p>
           <a:p>
             <a:r>
+              <a:rPr lang="de-DE" sz="1600" dirty="0" err="1" smtClean="0">
+                <a:latin typeface="Consolas" pitchFamily="49" charset="0"/>
+                <a:cs typeface="Consolas" pitchFamily="49" charset="0"/>
+              </a:rPr>
+              <a:t>people.findAll</a:t>
+            </a:r>
+            <a:r>
               <a:rPr lang="de-DE" sz="1600" dirty="0" smtClean="0">
                 <a:latin typeface="Consolas" pitchFamily="49" charset="0"/>
                 <a:cs typeface="Consolas" pitchFamily="49" charset="0"/>
               </a:rPr>
-              <a:t> </a:t>
+              <a:t>{</a:t>
+            </a:r>
+            <a:r>
+              <a:rPr lang="de-DE" sz="1600" dirty="0" err="1" smtClean="0">
+                <a:latin typeface="Consolas" pitchFamily="49" charset="0"/>
+                <a:cs typeface="Consolas" pitchFamily="49" charset="0"/>
+              </a:rPr>
+              <a:t>it.lastName</a:t>
             </a:r>
             <a:r>
               <a:rPr lang="de-DE" sz="1600" dirty="0" smtClean="0">
                 <a:latin typeface="Consolas" pitchFamily="49" charset="0"/>
                 <a:cs typeface="Consolas" pitchFamily="49" charset="0"/>
               </a:rPr>
-              <a:t>      </a:t>
+              <a:t> == '</a:t>
             </a:r>
             <a:r>
               <a:rPr lang="de-DE" sz="1600" dirty="0" err="1" smtClean="0">
                 <a:latin typeface="Consolas" pitchFamily="49" charset="0"/>
                 <a:cs typeface="Consolas" pitchFamily="49" charset="0"/>
               </a:rPr>
-              <a:t>people.findAll</a:t>
+              <a:t>Geröllheimer</a:t>
             </a:r>
             <a:r>
               <a:rPr lang="de-DE" sz="1600" dirty="0" smtClean="0">
                 <a:latin typeface="Consolas" pitchFamily="49" charset="0"/>
                 <a:cs typeface="Consolas" pitchFamily="49" charset="0"/>
               </a:rPr>
-              <a:t>{</a:t>
+              <a:t>'}</a:t>
+            </a:r>
+          </a:p>
+          <a:p>
+            <a:r>
+              <a:rPr lang="de-DE" sz="1600" dirty="0" smtClean="0">
+                <a:latin typeface="Consolas" pitchFamily="49" charset="0"/>
+                <a:cs typeface="Consolas" pitchFamily="49" charset="0"/>
+              </a:rPr>
+              <a:t>       .</a:t>
             </a:r>
             <a:r>
               <a:rPr lang="de-DE" sz="1600" dirty="0" err="1" smtClean="0">
                 <a:latin typeface="Consolas" pitchFamily="49" charset="0"/>
                 <a:cs typeface="Consolas" pitchFamily="49" charset="0"/>
               </a:rPr>
-              <a:t>it.lastName</a:t>
+              <a:t>each</a:t>
             </a:r>
             <a:r>
               <a:rPr lang="de-DE" sz="1600" dirty="0" smtClean="0">
                 <a:latin typeface="Consolas" pitchFamily="49" charset="0"/>
                 <a:cs typeface="Consolas" pitchFamily="49" charset="0"/>
               </a:rPr>
-              <a:t> == 'Feuerstein</a:t>
+              <a:t>{ </a:t>
+            </a:r>
+            <a:r>
+              <a:rPr lang="de-DE" sz="1600" dirty="0" err="1" smtClean="0">
+                <a:latin typeface="Consolas" pitchFamily="49" charset="0"/>
+                <a:cs typeface="Consolas" pitchFamily="49" charset="0"/>
+              </a:rPr>
+              <a:t>println</a:t>
             </a:r>
             <a:r>
               <a:rPr lang="de-DE" sz="1600" dirty="0" smtClean="0">
                 <a:latin typeface="Consolas" pitchFamily="49" charset="0"/>
                 <a:cs typeface="Consolas" pitchFamily="49" charset="0"/>
               </a:rPr>
-              <a:t>'}.</a:t>
-            </a:r>
-            <a:r>
-              <a:rPr lang="de-DE" sz="1600" dirty="0" err="1" smtClean="0">
-                <a:latin typeface="Consolas" pitchFamily="49" charset="0"/>
-                <a:cs typeface="Consolas" pitchFamily="49" charset="0"/>
-              </a:rPr>
-              <a:t>firstName</a:t>
-            </a:r>
-            <a:endParaRPr lang="de-DE" sz="1600" dirty="0" smtClean="0">
-              <a:latin typeface="Consolas" pitchFamily="49" charset="0"/>
-              <a:cs typeface="Consolas" pitchFamily="49" charset="0"/>
-            </a:endParaRPr>
-          </a:p>
-          <a:p>
-            <a:r>
-              <a:rPr lang="de-DE" sz="1600" dirty="0" err="1" smtClean="0">
-                <a:latin typeface="Consolas" pitchFamily="49" charset="0"/>
-                <a:cs typeface="Consolas" pitchFamily="49" charset="0"/>
-              </a:rPr>
-              <a:t>assert</a:t>
-            </a:r>
-            <a:r>
-              <a:rPr lang="de-DE" sz="1600" dirty="0" smtClean="0">
-                <a:latin typeface="Consolas" pitchFamily="49" charset="0"/>
-                <a:cs typeface="Consolas" pitchFamily="49" charset="0"/>
-              </a:rPr>
-              <a:t> ['Feuerstein':2, 'Geröllheimer':3] == </a:t>
-            </a:r>
-            <a:r>
-              <a:rPr lang="de-DE" sz="1600" dirty="0" err="1" smtClean="0">
-                <a:latin typeface="Consolas" pitchFamily="49" charset="0"/>
-                <a:cs typeface="Consolas" pitchFamily="49" charset="0"/>
-              </a:rPr>
-              <a:t>people.countBy</a:t>
-            </a:r>
-            <a:r>
-              <a:rPr lang="de-DE" sz="1600" dirty="0" smtClean="0">
-                <a:latin typeface="Consolas" pitchFamily="49" charset="0"/>
-                <a:cs typeface="Consolas" pitchFamily="49" charset="0"/>
-              </a:rPr>
-              <a:t>{</a:t>
-            </a:r>
-            <a:r>
-              <a:rPr lang="de-DE" sz="1600" dirty="0" err="1" smtClean="0">
-                <a:latin typeface="Consolas" pitchFamily="49" charset="0"/>
-                <a:cs typeface="Consolas" pitchFamily="49" charset="0"/>
-              </a:rPr>
-              <a:t>it.lastName</a:t>
-            </a:r>
-            <a:r>
-              <a:rPr lang="de-DE" sz="1600" dirty="0" smtClean="0">
-                <a:latin typeface="Consolas" pitchFamily="49" charset="0"/>
-                <a:cs typeface="Consolas" pitchFamily="49" charset="0"/>
-              </a:rPr>
-              <a:t>}</a:t>
-            </a:r>
-          </a:p>
-          <a:p>
-            <a:endParaRPr lang="de-DE" sz="1600" dirty="0" smtClean="0">
-              <a:latin typeface="Consolas" pitchFamily="49" charset="0"/>
-              <a:cs typeface="Consolas" pitchFamily="49" charset="0"/>
-            </a:endParaRPr>
-          </a:p>
-          <a:p>
-            <a:r>
-              <a:rPr lang="de-DE" sz="1600" dirty="0" err="1" smtClean="0">
-                <a:latin typeface="Consolas" pitchFamily="49" charset="0"/>
-                <a:cs typeface="Consolas" pitchFamily="49" charset="0"/>
-              </a:rPr>
-              <a:t>people.findAll</a:t>
-            </a:r>
-            <a:r>
-              <a:rPr lang="de-DE" sz="1600" dirty="0" smtClean="0">
-                <a:latin typeface="Consolas" pitchFamily="49" charset="0"/>
-                <a:cs typeface="Consolas" pitchFamily="49" charset="0"/>
-              </a:rPr>
-              <a:t>{</a:t>
-            </a:r>
-            <a:r>
-              <a:rPr lang="de-DE" sz="1600" dirty="0" err="1" smtClean="0">
-                <a:latin typeface="Consolas" pitchFamily="49" charset="0"/>
-                <a:cs typeface="Consolas" pitchFamily="49" charset="0"/>
-              </a:rPr>
-              <a:t>it.lastName</a:t>
-            </a:r>
-            <a:r>
-              <a:rPr lang="de-DE" sz="1600" dirty="0" smtClean="0">
-                <a:latin typeface="Consolas" pitchFamily="49" charset="0"/>
-                <a:cs typeface="Consolas" pitchFamily="49" charset="0"/>
-              </a:rPr>
-              <a:t> == '</a:t>
-            </a:r>
-            <a:r>
-              <a:rPr lang="de-DE" sz="1600" dirty="0" err="1" smtClean="0">
-                <a:latin typeface="Consolas" pitchFamily="49" charset="0"/>
-                <a:cs typeface="Consolas" pitchFamily="49" charset="0"/>
-              </a:rPr>
-              <a:t>Geröllheimer</a:t>
-            </a:r>
-            <a:r>
-              <a:rPr lang="de-DE" sz="1600" dirty="0" smtClean="0">
-                <a:latin typeface="Consolas" pitchFamily="49" charset="0"/>
-                <a:cs typeface="Consolas" pitchFamily="49" charset="0"/>
-              </a:rPr>
-              <a:t>'}</a:t>
-            </a:r>
-          </a:p>
-          <a:p>
-            <a:r>
-              <a:rPr lang="de-DE" sz="1600" dirty="0" smtClean="0">
-                <a:latin typeface="Consolas" pitchFamily="49" charset="0"/>
-                <a:cs typeface="Consolas" pitchFamily="49" charset="0"/>
-              </a:rPr>
-              <a:t> </a:t>
-            </a:r>
-            <a:r>
-              <a:rPr lang="de-DE" sz="1600" dirty="0" smtClean="0">
-                <a:latin typeface="Consolas" pitchFamily="49" charset="0"/>
-                <a:cs typeface="Consolas" pitchFamily="49" charset="0"/>
-              </a:rPr>
-              <a:t>      </a:t>
-            </a:r>
-            <a:r>
-              <a:rPr lang="de-DE" sz="1600" dirty="0" smtClean="0">
-                <a:latin typeface="Consolas" pitchFamily="49" charset="0"/>
-                <a:cs typeface="Consolas" pitchFamily="49" charset="0"/>
-              </a:rPr>
-              <a:t>.</a:t>
-            </a:r>
-            <a:r>
-              <a:rPr lang="de-DE" sz="1600" dirty="0" err="1" smtClean="0">
-                <a:latin typeface="Consolas" pitchFamily="49" charset="0"/>
-                <a:cs typeface="Consolas" pitchFamily="49" charset="0"/>
-              </a:rPr>
-              <a:t>each</a:t>
-            </a:r>
-            <a:r>
-              <a:rPr lang="de-DE" sz="1600" dirty="0" smtClean="0">
-                <a:latin typeface="Consolas" pitchFamily="49" charset="0"/>
-                <a:cs typeface="Consolas" pitchFamily="49" charset="0"/>
-              </a:rPr>
-              <a:t>{ </a:t>
-            </a:r>
-            <a:r>
-              <a:rPr lang="de-DE" sz="1600" dirty="0" err="1" smtClean="0">
-                <a:latin typeface="Consolas" pitchFamily="49" charset="0"/>
-                <a:cs typeface="Consolas" pitchFamily="49" charset="0"/>
-              </a:rPr>
-              <a:t>println</a:t>
-            </a:r>
-            <a:r>
-              <a:rPr lang="de-DE" sz="1600" dirty="0" smtClean="0">
-                <a:latin typeface="Consolas" pitchFamily="49" charset="0"/>
-                <a:cs typeface="Consolas" pitchFamily="49" charset="0"/>
-              </a:rPr>
-              <a:t> </a:t>
-            </a:r>
-            <a:r>
-              <a:rPr lang="de-DE" sz="1600" dirty="0" smtClean="0">
-                <a:latin typeface="Consolas" pitchFamily="49" charset="0"/>
-                <a:cs typeface="Consolas" pitchFamily="49" charset="0"/>
-              </a:rPr>
-              <a:t>"</a:t>
+              <a:t> "</a:t>
             </a:r>
             <a:r>
               <a:rPr lang="de-DE" sz="1600" dirty="0" err="1" smtClean="0">
@@ -22441,7 +22391,7 @@
         </p:nvPicPr>
         <p:blipFill>
           <a:blip r:embed="rId2" cstate="print"/>
-          <a:srcRect l="22682" t="18059" r="14255" b="57554"/>
+          <a:srcRect/>
           <a:stretch>
             <a:fillRect/>
           </a:stretch>
@@ -22729,7 +22679,7 @@
         </p:nvPicPr>
         <p:blipFill>
           <a:blip r:embed="rId5" cstate="print"/>
-          <a:srcRect l="8129" r="6522"/>
+          <a:srcRect/>
           <a:stretch>
             <a:fillRect/>
           </a:stretch>
@@ -25021,7 +24971,7 @@
           <a:blip r:embed="rId2" cstate="print">
             <a:extLst>
               <a:ext uri="{28A0092B-C50C-407E-A947-70E740481C1C}">
-                <a14:useLocalDpi xmlns:a14="http://schemas.microsoft.com/office/drawing/2010/main" xmlns="" val="0"/>
+                <a14:useLocalDpi xmlns="" xmlns:a14="http://schemas.microsoft.com/office/drawing/2010/main" val="0"/>
               </a:ext>
             </a:extLst>
           </a:blip>
@@ -25186,27 +25136,7 @@
                 <a:latin typeface="Consolas" pitchFamily="49" charset="0"/>
                 <a:cs typeface="Consolas" pitchFamily="49" charset="0"/>
               </a:rPr>
-              <a:t>// Alle Personen im Alter zwischen </a:t>
-            </a:r>
-            <a:r>
-              <a:rPr lang="de-DE" dirty="0" smtClean="0">
-                <a:solidFill>
-                  <a:schemeClr val="bg2"/>
-                </a:solidFill>
-                <a:latin typeface="Consolas" pitchFamily="49" charset="0"/>
-                <a:cs typeface="Consolas" pitchFamily="49" charset="0"/>
-              </a:rPr>
-              <a:t>2</a:t>
-            </a:r>
-            <a:r>
-              <a:rPr lang="de-DE" dirty="0" smtClean="0">
-                <a:solidFill>
-                  <a:schemeClr val="bg2"/>
-                </a:solidFill>
-                <a:latin typeface="Consolas" pitchFamily="49" charset="0"/>
-                <a:cs typeface="Consolas" pitchFamily="49" charset="0"/>
-              </a:rPr>
-              <a:t> und 10 Jahren</a:t>
+              <a:t>// Alle Personen im Alter zwischen 2 und 10 Jahren</a:t>
             </a:r>
           </a:p>
           <a:p>
@@ -25302,7 +25232,7 @@
     </p:spTree>
     <p:extLst>
       <p:ext uri="{BB962C8B-B14F-4D97-AF65-F5344CB8AC3E}">
-        <p14:creationId xmlns:p14="http://schemas.microsoft.com/office/powerpoint/2010/main" xmlns="" val="3520320325"/>
+        <p14:creationId xmlns="" xmlns:p14="http://schemas.microsoft.com/office/powerpoint/2010/main" val="3520320325"/>
       </p:ext>
     </p:extLst>
   </p:cSld>
@@ -25923,7 +25853,7 @@
         </p:nvPicPr>
         <p:blipFill>
           <a:blip r:embed="rId2" cstate="print"/>
-          <a:srcRect l="38877" t="21331" r="17857" b="22053"/>
+          <a:srcRect/>
           <a:stretch>
             <a:fillRect/>
           </a:stretch>
@@ -30076,7 +30006,7 @@
     </p:spTree>
     <p:extLst>
       <p:ext uri="{BB962C8B-B14F-4D97-AF65-F5344CB8AC3E}">
-        <p14:creationId xmlns:p14="http://schemas.microsoft.com/office/powerpoint/2010/main" xmlns="" val="1364891894"/>
+        <p14:creationId xmlns="" xmlns:p14="http://schemas.microsoft.com/office/powerpoint/2010/main" val="1364891894"/>
       </p:ext>
     </p:extLst>
   </p:cSld>
@@ -30929,7 +30859,7 @@
             <a:blip r:embed="rId5" cstate="print">
               <a:extLst>
                 <a:ext uri="{28A0092B-C50C-407E-A947-70E740481C1C}">
-                  <a14:useLocalDpi xmlns:a14="http://schemas.microsoft.com/office/drawing/2010/main" xmlns="" val="0"/>
+                  <a14:useLocalDpi xmlns="" xmlns:a14="http://schemas.microsoft.com/office/drawing/2010/main" val="0"/>
                 </a:ext>
               </a:extLst>
             </a:blip>
@@ -30959,7 +30889,7 @@
             <a:blip r:embed="rId6" cstate="print">
               <a:extLst>
                 <a:ext uri="{28A0092B-C50C-407E-A947-70E740481C1C}">
-                  <a14:useLocalDpi xmlns:a14="http://schemas.microsoft.com/office/drawing/2010/main" xmlns="" val="0"/>
+                  <a14:useLocalDpi xmlns="" xmlns:a14="http://schemas.microsoft.com/office/drawing/2010/main" val="0"/>
                 </a:ext>
               </a:extLst>
             </a:blip>
@@ -30989,7 +30919,7 @@
             <a:blip r:embed="rId7" cstate="print">
               <a:extLst>
                 <a:ext uri="{28A0092B-C50C-407E-A947-70E740481C1C}">
-                  <a14:useLocalDpi xmlns:a14="http://schemas.microsoft.com/office/drawing/2010/main" xmlns="" val="0"/>
+                  <a14:useLocalDpi xmlns="" xmlns:a14="http://schemas.microsoft.com/office/drawing/2010/main" val="0"/>
                 </a:ext>
               </a:extLst>
             </a:blip>
@@ -31020,12 +30950,17 @@
         </p:nvPicPr>
         <p:blipFill>
           <a:blip r:embed="rId8" cstate="print"/>
-          <a:srcRect t="9375" b="9375"/>
+          <a:srcRect l="10504" r="11606"/>
           <a:stretch>
             <a:fillRect/>
           </a:stretch>
         </p:blipFill>
-        <p:spPr/>
+        <p:spPr>
+          <a:xfrm>
+            <a:off x="7380312" y="1357298"/>
+            <a:ext cx="1224136" cy="1571636"/>
+          </a:xfrm>
+        </p:spPr>
       </p:pic>
       <p:pic>
         <p:nvPicPr>
@@ -31058,7 +30993,7 @@
     </p:spTree>
     <p:extLst>
       <p:ext uri="{BB962C8B-B14F-4D97-AF65-F5344CB8AC3E}">
-        <p14:creationId xmlns:p14="http://schemas.microsoft.com/office/powerpoint/2010/main" xmlns="" val="1074872443"/>
+        <p14:creationId xmlns="" xmlns:p14="http://schemas.microsoft.com/office/powerpoint/2010/main" val="1074872443"/>
       </p:ext>
     </p:extLst>
   </p:cSld>
@@ -31216,7 +31151,7 @@
             <p:ph idx="1"/>
             <p:extLst>
               <p:ext uri="{D42A27DB-BD31-4B8C-83A1-F6EECF244321}">
-                <p14:modId xmlns:p14="http://schemas.microsoft.com/office/powerpoint/2010/main" xmlns="" val="3161229493"/>
+                <p14:modId xmlns="" xmlns:p14="http://schemas.microsoft.com/office/powerpoint/2010/main" val="3161229493"/>
               </p:ext>
             </p:extLst>
           </p:nvPr>
@@ -32465,7 +32400,7 @@
           <a:blip r:embed="rId2" cstate="print">
             <a:extLst>
               <a:ext uri="{28A0092B-C50C-407E-A947-70E740481C1C}">
-                <a14:useLocalDpi xmlns:a14="http://schemas.microsoft.com/office/drawing/2010/main" xmlns="" val="0"/>
+                <a14:useLocalDpi xmlns="" xmlns:a14="http://schemas.microsoft.com/office/drawing/2010/main" val="0"/>
               </a:ext>
             </a:extLst>
           </a:blip>
@@ -32495,7 +32430,7 @@
           <a:blip r:embed="rId3" cstate="print">
             <a:extLst>
               <a:ext uri="{28A0092B-C50C-407E-A947-70E740481C1C}">
-                <a14:useLocalDpi xmlns:a14="http://schemas.microsoft.com/office/drawing/2010/main" xmlns="" val="0"/>
+                <a14:useLocalDpi xmlns="" xmlns:a14="http://schemas.microsoft.com/office/drawing/2010/main" val="0"/>
               </a:ext>
             </a:extLst>
           </a:blip>
@@ -32525,7 +32460,7 @@
           <a:blip r:embed="rId4" cstate="print">
             <a:extLst>
               <a:ext uri="{28A0092B-C50C-407E-A947-70E740481C1C}">
-                <a14:useLocalDpi xmlns:a14="http://schemas.microsoft.com/office/drawing/2010/main" xmlns="" val="0"/>
+                <a14:useLocalDpi xmlns="" xmlns:a14="http://schemas.microsoft.com/office/drawing/2010/main" val="0"/>
               </a:ext>
             </a:extLst>
           </a:blip>
@@ -32546,7 +32481,7 @@
     </p:spTree>
     <p:extLst>
       <p:ext uri="{BB962C8B-B14F-4D97-AF65-F5344CB8AC3E}">
-        <p14:creationId xmlns:p14="http://schemas.microsoft.com/office/powerpoint/2010/main" xmlns="" val="2868768242"/>
+        <p14:creationId xmlns="" xmlns:p14="http://schemas.microsoft.com/office/powerpoint/2010/main" val="2868768242"/>
       </p:ext>
     </p:extLst>
   </p:cSld>
@@ -32925,11 +32860,7 @@
           <a:p>
             <a:r>
               <a:rPr lang="de-DE" dirty="0" smtClean="0"/>
-              <a:t>Nahtlose Integration existierender Java Klassen und </a:t>
-            </a:r>
-            <a:r>
-              <a:rPr lang="de-DE" dirty="0" smtClean="0"/>
-              <a:t>Bibliotheken</a:t>
+              <a:t>Nahtlose Integration existierender Java Klassen und Bibliotheken</a:t>
             </a:r>
           </a:p>
           <a:p>
@@ -34145,12 +34076,15 @@
 </file>
 
 <file path=customXml/item1.xml><?xml version="1.0" encoding="utf-8"?>
-<?mso-contentType ?>
-<FormTemplates xmlns="http://schemas.microsoft.com/sharepoint/v3/contenttype/forms">
-  <Display>DocumentLibraryForm</Display>
-  <Edit>DocumentLibraryForm</Edit>
-  <New>DocumentLibraryForm</New>
-</FormTemplates>
+<p:properties xmlns:p="http://schemas.microsoft.com/office/2006/metadata/properties" xmlns:xsi="http://www.w3.org/2001/XMLSchema-instance">
+  <documentManagement>
+    <_dlc_DocId xmlns="8cc9f148-63af-4ae4-b4c0-3a33ca8129b3">DOCID-7-65</_dlc_DocId>
+    <_dlc_DocIdUrl xmlns="8cc9f148-63af-4ae4-b4c0-3a33ca8129b3">
+      <Url>https://portal.opitz-consulting.de/_layouts/DocIdRedir.aspx?ID=DOCID-7-65</Url>
+      <Description>DOCID-7-65</Description>
+    </_dlc_DocIdUrl>
+  </documentManagement>
+</p:properties>
 </file>
 
 <file path=customXml/item2.xml><?xml version="1.0" encoding="utf-8"?>
@@ -34200,15 +34134,12 @@
 </file>
 
 <file path=customXml/item3.xml><?xml version="1.0" encoding="utf-8"?>
-<p:properties xmlns:p="http://schemas.microsoft.com/office/2006/metadata/properties" xmlns:xsi="http://www.w3.org/2001/XMLSchema-instance">
-  <documentManagement>
-    <_dlc_DocId xmlns="8cc9f148-63af-4ae4-b4c0-3a33ca8129b3">DOCID-7-65</_dlc_DocId>
-    <_dlc_DocIdUrl xmlns="8cc9f148-63af-4ae4-b4c0-3a33ca8129b3">
-      <Url>https://portal.opitz-consulting.de/_layouts/DocIdRedir.aspx?ID=DOCID-7-65</Url>
-      <Description>DOCID-7-65</Description>
-    </_dlc_DocIdUrl>
-  </documentManagement>
-</p:properties>
+<?mso-contentType ?>
+<FormTemplates xmlns="http://schemas.microsoft.com/sharepoint/v3/contenttype/forms">
+  <Display>DocumentLibraryForm</Display>
+  <Edit>DocumentLibraryForm</Edit>
+  <New>DocumentLibraryForm</New>
+</FormTemplates>
 </file>
 
 <file path=customXml/item4.xml><?xml version="1.0" encoding="utf-8"?>
@@ -34357,9 +34288,10 @@
 </file>
 
 <file path=customXml/itemProps1.xml><?xml version="1.0" encoding="utf-8"?>
-<ds:datastoreItem xmlns:ds="http://schemas.openxmlformats.org/officeDocument/2006/customXml" ds:itemID="{7E7A0F45-7BDE-4AA7-A1BB-E146938E8111}">
+<ds:datastoreItem xmlns:ds="http://schemas.openxmlformats.org/officeDocument/2006/customXml" ds:itemID="{AF7E4967-43BC-4F71-AEEC-BDE09349FE60}">
   <ds:schemaRefs>
-    <ds:schemaRef ds:uri="http://schemas.microsoft.com/sharepoint/v3/contenttype/forms"/>
+    <ds:schemaRef ds:uri="http://schemas.microsoft.com/office/2006/metadata/properties"/>
+    <ds:schemaRef ds:uri="8cc9f148-63af-4ae4-b4c0-3a33ca8129b3"/>
   </ds:schemaRefs>
 </ds:datastoreItem>
 </file>
@@ -34373,10 +34305,9 @@
 </file>
 
 <file path=customXml/itemProps3.xml><?xml version="1.0" encoding="utf-8"?>
-<ds:datastoreItem xmlns:ds="http://schemas.openxmlformats.org/officeDocument/2006/customXml" ds:itemID="{AF7E4967-43BC-4F71-AEEC-BDE09349FE60}">
+<ds:datastoreItem xmlns:ds="http://schemas.openxmlformats.org/officeDocument/2006/customXml" ds:itemID="{7E7A0F45-7BDE-4AA7-A1BB-E146938E8111}">
   <ds:schemaRefs>
-    <ds:schemaRef ds:uri="http://schemas.microsoft.com/office/2006/metadata/properties"/>
-    <ds:schemaRef ds:uri="8cc9f148-63af-4ae4-b4c0-3a33ca8129b3"/>
+    <ds:schemaRef ds:uri="http://schemas.microsoft.com/sharepoint/v3/contenttype/forms"/>
   </ds:schemaRefs>
 </ds:datastoreItem>
 </file>

</xml_diff>